<commit_message>
Chapter Architecture added new conpects and new graphics to illustrate layering
</commit_message>
<xml_diff>
--- a/Folien/Architektur.pptx
+++ b/Folien/Architektur.pptx
@@ -7,6 +7,7 @@
   <p:sldIdLst>
     <p:sldId id="256" r:id="rId2"/>
     <p:sldId id="257" r:id="rId3"/>
+    <p:sldId id="258" r:id="rId4"/>
   </p:sldIdLst>
   <p:sldSz cx="12192000" cy="6858000"/>
   <p:notesSz cx="6858000" cy="9144000"/>
@@ -244,7 +245,7 @@
           <a:p>
             <a:fld id="{3ECF767C-0B60-4C2A-BFC7-A95580570F96}" type="datetimeFigureOut">
               <a:rPr lang="de-CH" smtClean="0"/>
-              <a:t>03.05.2016</a:t>
+              <a:t>08.05.2016</a:t>
             </a:fld>
             <a:endParaRPr lang="de-CH"/>
           </a:p>
@@ -414,7 +415,7 @@
           <a:p>
             <a:fld id="{3ECF767C-0B60-4C2A-BFC7-A95580570F96}" type="datetimeFigureOut">
               <a:rPr lang="de-CH" smtClean="0"/>
-              <a:t>03.05.2016</a:t>
+              <a:t>08.05.2016</a:t>
             </a:fld>
             <a:endParaRPr lang="de-CH"/>
           </a:p>
@@ -594,7 +595,7 @@
           <a:p>
             <a:fld id="{3ECF767C-0B60-4C2A-BFC7-A95580570F96}" type="datetimeFigureOut">
               <a:rPr lang="de-CH" smtClean="0"/>
-              <a:t>03.05.2016</a:t>
+              <a:t>08.05.2016</a:t>
             </a:fld>
             <a:endParaRPr lang="de-CH"/>
           </a:p>
@@ -764,7 +765,7 @@
           <a:p>
             <a:fld id="{3ECF767C-0B60-4C2A-BFC7-A95580570F96}" type="datetimeFigureOut">
               <a:rPr lang="de-CH" smtClean="0"/>
-              <a:t>03.05.2016</a:t>
+              <a:t>08.05.2016</a:t>
             </a:fld>
             <a:endParaRPr lang="de-CH"/>
           </a:p>
@@ -1010,7 +1011,7 @@
           <a:p>
             <a:fld id="{3ECF767C-0B60-4C2A-BFC7-A95580570F96}" type="datetimeFigureOut">
               <a:rPr lang="de-CH" smtClean="0"/>
-              <a:t>03.05.2016</a:t>
+              <a:t>08.05.2016</a:t>
             </a:fld>
             <a:endParaRPr lang="de-CH"/>
           </a:p>
@@ -1242,7 +1243,7 @@
           <a:p>
             <a:fld id="{3ECF767C-0B60-4C2A-BFC7-A95580570F96}" type="datetimeFigureOut">
               <a:rPr lang="de-CH" smtClean="0"/>
-              <a:t>03.05.2016</a:t>
+              <a:t>08.05.2016</a:t>
             </a:fld>
             <a:endParaRPr lang="de-CH"/>
           </a:p>
@@ -1609,7 +1610,7 @@
           <a:p>
             <a:fld id="{3ECF767C-0B60-4C2A-BFC7-A95580570F96}" type="datetimeFigureOut">
               <a:rPr lang="de-CH" smtClean="0"/>
-              <a:t>03.05.2016</a:t>
+              <a:t>08.05.2016</a:t>
             </a:fld>
             <a:endParaRPr lang="de-CH"/>
           </a:p>
@@ -1727,7 +1728,7 @@
           <a:p>
             <a:fld id="{3ECF767C-0B60-4C2A-BFC7-A95580570F96}" type="datetimeFigureOut">
               <a:rPr lang="de-CH" smtClean="0"/>
-              <a:t>03.05.2016</a:t>
+              <a:t>08.05.2016</a:t>
             </a:fld>
             <a:endParaRPr lang="de-CH"/>
           </a:p>
@@ -1822,7 +1823,7 @@
           <a:p>
             <a:fld id="{3ECF767C-0B60-4C2A-BFC7-A95580570F96}" type="datetimeFigureOut">
               <a:rPr lang="de-CH" smtClean="0"/>
-              <a:t>03.05.2016</a:t>
+              <a:t>08.05.2016</a:t>
             </a:fld>
             <a:endParaRPr lang="de-CH"/>
           </a:p>
@@ -2099,7 +2100,7 @@
           <a:p>
             <a:fld id="{3ECF767C-0B60-4C2A-BFC7-A95580570F96}" type="datetimeFigureOut">
               <a:rPr lang="de-CH" smtClean="0"/>
-              <a:t>03.05.2016</a:t>
+              <a:t>08.05.2016</a:t>
             </a:fld>
             <a:endParaRPr lang="de-CH"/>
           </a:p>
@@ -2352,7 +2353,7 @@
           <a:p>
             <a:fld id="{3ECF767C-0B60-4C2A-BFC7-A95580570F96}" type="datetimeFigureOut">
               <a:rPr lang="de-CH" smtClean="0"/>
-              <a:t>03.05.2016</a:t>
+              <a:t>08.05.2016</a:t>
             </a:fld>
             <a:endParaRPr lang="de-CH"/>
           </a:p>
@@ -2565,7 +2566,7 @@
           <a:p>
             <a:fld id="{3ECF767C-0B60-4C2A-BFC7-A95580570F96}" type="datetimeFigureOut">
               <a:rPr lang="de-CH" smtClean="0"/>
-              <a:t>03.05.2016</a:t>
+              <a:t>08.05.2016</a:t>
             </a:fld>
             <a:endParaRPr lang="de-CH"/>
           </a:p>
@@ -5281,6 +5282,587 @@
 </p:sld>
 </file>
 
+<file path=ppt/slides/slide3.xml><?xml version="1.0" encoding="utf-8"?>
+<p:sld xmlns:a="http://schemas.openxmlformats.org/drawingml/2006/main" xmlns:r="http://schemas.openxmlformats.org/officeDocument/2006/relationships" xmlns:p="http://schemas.openxmlformats.org/presentationml/2006/main">
+  <p:cSld>
+    <p:spTree>
+      <p:nvGrpSpPr>
+        <p:cNvPr id="1" name=""/>
+        <p:cNvGrpSpPr/>
+        <p:nvPr/>
+      </p:nvGrpSpPr>
+      <p:grpSpPr>
+        <a:xfrm>
+          <a:off x="0" y="0"/>
+          <a:ext cx="0" cy="0"/>
+          <a:chOff x="0" y="0"/>
+          <a:chExt cx="0" cy="0"/>
+        </a:xfrm>
+      </p:grpSpPr>
+      <p:sp>
+        <p:nvSpPr>
+          <p:cNvPr id="2" name="Rechteck 1"/>
+          <p:cNvSpPr/>
+          <p:nvPr/>
+        </p:nvSpPr>
+        <p:spPr>
+          <a:xfrm>
+            <a:off x="3523376" y="478173"/>
+            <a:ext cx="4941116" cy="989900"/>
+          </a:xfrm>
+          <a:prstGeom prst="rect">
+            <a:avLst/>
+          </a:prstGeom>
+          <a:solidFill>
+            <a:schemeClr val="bg2">
+              <a:lumMod val="75000"/>
+            </a:schemeClr>
+          </a:solidFill>
+          <a:ln>
+            <a:solidFill>
+              <a:schemeClr val="bg2">
+                <a:lumMod val="75000"/>
+              </a:schemeClr>
+            </a:solidFill>
+          </a:ln>
+        </p:spPr>
+        <p:style>
+          <a:lnRef idx="2">
+            <a:schemeClr val="accent1">
+              <a:shade val="50000"/>
+            </a:schemeClr>
+          </a:lnRef>
+          <a:fillRef idx="1">
+            <a:schemeClr val="accent1"/>
+          </a:fillRef>
+          <a:effectRef idx="0">
+            <a:schemeClr val="accent1"/>
+          </a:effectRef>
+          <a:fontRef idx="minor">
+            <a:schemeClr val="lt1"/>
+          </a:fontRef>
+        </p:style>
+        <p:txBody>
+          <a:bodyPr rtlCol="0" anchor="b"/>
+          <a:lstStyle/>
+          <a:p>
+            <a:pPr algn="ctr"/>
+            <a:r>
+              <a:rPr lang="de-CH" dirty="0"/>
+              <a:t>Client</a:t>
+            </a:r>
+          </a:p>
+        </p:txBody>
+      </p:sp>
+      <p:sp>
+        <p:nvSpPr>
+          <p:cNvPr id="3" name="Rechteck 2"/>
+          <p:cNvSpPr/>
+          <p:nvPr/>
+        </p:nvSpPr>
+        <p:spPr>
+          <a:xfrm>
+            <a:off x="3704438" y="552974"/>
+            <a:ext cx="4578991" cy="613096"/>
+          </a:xfrm>
+          <a:prstGeom prst="rect">
+            <a:avLst/>
+          </a:prstGeom>
+          <a:solidFill>
+            <a:schemeClr val="accent4"/>
+          </a:solidFill>
+          <a:ln>
+            <a:solidFill>
+              <a:srgbClr val="FFC000"/>
+            </a:solidFill>
+          </a:ln>
+        </p:spPr>
+        <p:style>
+          <a:lnRef idx="2">
+            <a:schemeClr val="accent1">
+              <a:shade val="50000"/>
+            </a:schemeClr>
+          </a:lnRef>
+          <a:fillRef idx="1">
+            <a:schemeClr val="accent1"/>
+          </a:fillRef>
+          <a:effectRef idx="0">
+            <a:schemeClr val="accent1"/>
+          </a:effectRef>
+          <a:fontRef idx="minor">
+            <a:schemeClr val="lt1"/>
+          </a:fontRef>
+        </p:style>
+        <p:txBody>
+          <a:bodyPr rtlCol="0" anchor="ctr"/>
+          <a:lstStyle/>
+          <a:p>
+            <a:pPr algn="ctr"/>
+            <a:r>
+              <a:rPr lang="de-CH" dirty="0" err="1"/>
+              <a:t>Presentation</a:t>
+            </a:r>
+            <a:r>
+              <a:rPr lang="de-CH" dirty="0"/>
+              <a:t> </a:t>
+            </a:r>
+            <a:r>
+              <a:rPr lang="de-CH" dirty="0" err="1"/>
+              <a:t>Logic</a:t>
+            </a:r>
+            <a:endParaRPr lang="de-CH" dirty="0"/>
+          </a:p>
+        </p:txBody>
+      </p:sp>
+      <p:sp>
+        <p:nvSpPr>
+          <p:cNvPr id="4" name="Rechteck 3"/>
+          <p:cNvSpPr/>
+          <p:nvPr/>
+        </p:nvSpPr>
+        <p:spPr>
+          <a:xfrm>
+            <a:off x="3523375" y="1914087"/>
+            <a:ext cx="4941116" cy="3052196"/>
+          </a:xfrm>
+          <a:prstGeom prst="rect">
+            <a:avLst/>
+          </a:prstGeom>
+          <a:solidFill>
+            <a:schemeClr val="bg2">
+              <a:lumMod val="75000"/>
+            </a:schemeClr>
+          </a:solidFill>
+          <a:ln>
+            <a:solidFill>
+              <a:schemeClr val="bg2">
+                <a:lumMod val="75000"/>
+              </a:schemeClr>
+            </a:solidFill>
+          </a:ln>
+        </p:spPr>
+        <p:style>
+          <a:lnRef idx="2">
+            <a:schemeClr val="accent1">
+              <a:shade val="50000"/>
+            </a:schemeClr>
+          </a:lnRef>
+          <a:fillRef idx="1">
+            <a:schemeClr val="accent1"/>
+          </a:fillRef>
+          <a:effectRef idx="0">
+            <a:schemeClr val="accent1"/>
+          </a:effectRef>
+          <a:fontRef idx="minor">
+            <a:schemeClr val="lt1"/>
+          </a:fontRef>
+        </p:style>
+        <p:txBody>
+          <a:bodyPr rtlCol="0" anchor="b"/>
+          <a:lstStyle/>
+          <a:p>
+            <a:pPr algn="ctr"/>
+            <a:r>
+              <a:rPr lang="de-CH" dirty="0" err="1"/>
+              <a:t>Application</a:t>
+            </a:r>
+            <a:r>
+              <a:rPr lang="de-CH" dirty="0"/>
+              <a:t> Server</a:t>
+            </a:r>
+          </a:p>
+        </p:txBody>
+      </p:sp>
+      <p:sp>
+        <p:nvSpPr>
+          <p:cNvPr id="5" name="Rechteck 4"/>
+          <p:cNvSpPr/>
+          <p:nvPr/>
+        </p:nvSpPr>
+        <p:spPr>
+          <a:xfrm>
+            <a:off x="3704438" y="1997278"/>
+            <a:ext cx="4578991" cy="613096"/>
+          </a:xfrm>
+          <a:prstGeom prst="rect">
+            <a:avLst/>
+          </a:prstGeom>
+          <a:solidFill>
+            <a:schemeClr val="accent4"/>
+          </a:solidFill>
+          <a:ln>
+            <a:solidFill>
+              <a:srgbClr val="FFC000"/>
+            </a:solidFill>
+          </a:ln>
+        </p:spPr>
+        <p:style>
+          <a:lnRef idx="2">
+            <a:schemeClr val="accent1">
+              <a:shade val="50000"/>
+            </a:schemeClr>
+          </a:lnRef>
+          <a:fillRef idx="1">
+            <a:schemeClr val="accent1"/>
+          </a:fillRef>
+          <a:effectRef idx="0">
+            <a:schemeClr val="accent1"/>
+          </a:effectRef>
+          <a:fontRef idx="minor">
+            <a:schemeClr val="lt1"/>
+          </a:fontRef>
+        </p:style>
+        <p:txBody>
+          <a:bodyPr rtlCol="0" anchor="ctr"/>
+          <a:lstStyle/>
+          <a:p>
+            <a:pPr algn="ctr"/>
+            <a:r>
+              <a:rPr lang="de-CH" dirty="0" err="1"/>
+              <a:t>Presentation</a:t>
+            </a:r>
+            <a:r>
+              <a:rPr lang="de-CH" dirty="0"/>
+              <a:t> </a:t>
+            </a:r>
+            <a:r>
+              <a:rPr lang="de-CH" dirty="0" err="1"/>
+              <a:t>Logic</a:t>
+            </a:r>
+            <a:endParaRPr lang="de-CH" dirty="0"/>
+          </a:p>
+        </p:txBody>
+      </p:sp>
+      <p:sp>
+        <p:nvSpPr>
+          <p:cNvPr id="6" name="Rechteck 5"/>
+          <p:cNvSpPr/>
+          <p:nvPr/>
+        </p:nvSpPr>
+        <p:spPr>
+          <a:xfrm>
+            <a:off x="3704438" y="2693565"/>
+            <a:ext cx="4578991" cy="1233182"/>
+          </a:xfrm>
+          <a:prstGeom prst="rect">
+            <a:avLst/>
+          </a:prstGeom>
+          <a:solidFill>
+            <a:schemeClr val="accent6"/>
+          </a:solidFill>
+          <a:ln>
+            <a:solidFill>
+              <a:schemeClr val="accent6"/>
+            </a:solidFill>
+          </a:ln>
+        </p:spPr>
+        <p:style>
+          <a:lnRef idx="2">
+            <a:schemeClr val="accent1">
+              <a:shade val="50000"/>
+            </a:schemeClr>
+          </a:lnRef>
+          <a:fillRef idx="1">
+            <a:schemeClr val="accent1"/>
+          </a:fillRef>
+          <a:effectRef idx="0">
+            <a:schemeClr val="accent1"/>
+          </a:effectRef>
+          <a:fontRef idx="minor">
+            <a:schemeClr val="lt1"/>
+          </a:fontRef>
+        </p:style>
+        <p:txBody>
+          <a:bodyPr rtlCol="0" anchor="ctr"/>
+          <a:lstStyle/>
+          <a:p>
+            <a:pPr algn="ctr"/>
+            <a:r>
+              <a:rPr lang="de-CH" dirty="0" err="1"/>
+              <a:t>Application</a:t>
+            </a:r>
+            <a:r>
+              <a:rPr lang="de-CH" dirty="0"/>
+              <a:t> </a:t>
+            </a:r>
+            <a:r>
+              <a:rPr lang="de-CH" dirty="0" err="1"/>
+              <a:t>Logic</a:t>
+            </a:r>
+            <a:endParaRPr lang="de-CH" dirty="0"/>
+          </a:p>
+        </p:txBody>
+      </p:sp>
+      <p:sp>
+        <p:nvSpPr>
+          <p:cNvPr id="7" name="Rechteck 6"/>
+          <p:cNvSpPr/>
+          <p:nvPr/>
+        </p:nvSpPr>
+        <p:spPr>
+          <a:xfrm>
+            <a:off x="3704437" y="4009938"/>
+            <a:ext cx="4578991" cy="613096"/>
+          </a:xfrm>
+          <a:prstGeom prst="rect">
+            <a:avLst/>
+          </a:prstGeom>
+          <a:solidFill>
+            <a:schemeClr val="accent1"/>
+          </a:solidFill>
+          <a:ln>
+            <a:solidFill>
+              <a:schemeClr val="accent1"/>
+            </a:solidFill>
+          </a:ln>
+        </p:spPr>
+        <p:style>
+          <a:lnRef idx="2">
+            <a:schemeClr val="accent1">
+              <a:shade val="50000"/>
+            </a:schemeClr>
+          </a:lnRef>
+          <a:fillRef idx="1">
+            <a:schemeClr val="accent1"/>
+          </a:fillRef>
+          <a:effectRef idx="0">
+            <a:schemeClr val="accent1"/>
+          </a:effectRef>
+          <a:fontRef idx="minor">
+            <a:schemeClr val="lt1"/>
+          </a:fontRef>
+        </p:style>
+        <p:txBody>
+          <a:bodyPr rtlCol="0" anchor="ctr"/>
+          <a:lstStyle/>
+          <a:p>
+            <a:pPr algn="ctr"/>
+            <a:r>
+              <a:rPr lang="de-CH" dirty="0" err="1"/>
+              <a:t>Resource</a:t>
+            </a:r>
+            <a:r>
+              <a:rPr lang="de-CH" dirty="0"/>
+              <a:t> </a:t>
+            </a:r>
+            <a:r>
+              <a:rPr lang="de-CH" dirty="0" err="1"/>
+              <a:t>Logic</a:t>
+            </a:r>
+            <a:endParaRPr lang="de-CH" dirty="0"/>
+          </a:p>
+        </p:txBody>
+      </p:sp>
+      <p:sp>
+        <p:nvSpPr>
+          <p:cNvPr id="9" name="Rechteck 8"/>
+          <p:cNvSpPr/>
+          <p:nvPr/>
+        </p:nvSpPr>
+        <p:spPr>
+          <a:xfrm>
+            <a:off x="3523375" y="5412297"/>
+            <a:ext cx="4941116" cy="982911"/>
+          </a:xfrm>
+          <a:prstGeom prst="rect">
+            <a:avLst/>
+          </a:prstGeom>
+          <a:solidFill>
+            <a:schemeClr val="bg2">
+              <a:lumMod val="75000"/>
+            </a:schemeClr>
+          </a:solidFill>
+          <a:ln>
+            <a:solidFill>
+              <a:schemeClr val="bg2">
+                <a:lumMod val="75000"/>
+              </a:schemeClr>
+            </a:solidFill>
+          </a:ln>
+        </p:spPr>
+        <p:style>
+          <a:lnRef idx="2">
+            <a:schemeClr val="accent1">
+              <a:shade val="50000"/>
+            </a:schemeClr>
+          </a:lnRef>
+          <a:fillRef idx="1">
+            <a:schemeClr val="accent1"/>
+          </a:fillRef>
+          <a:effectRef idx="0">
+            <a:schemeClr val="accent1"/>
+          </a:effectRef>
+          <a:fontRef idx="minor">
+            <a:schemeClr val="lt1"/>
+          </a:fontRef>
+        </p:style>
+        <p:txBody>
+          <a:bodyPr rtlCol="0" anchor="b"/>
+          <a:lstStyle/>
+          <a:p>
+            <a:pPr algn="ctr"/>
+            <a:r>
+              <a:rPr lang="de-CH" dirty="0"/>
+              <a:t>Database</a:t>
+            </a:r>
+          </a:p>
+        </p:txBody>
+      </p:sp>
+      <p:sp>
+        <p:nvSpPr>
+          <p:cNvPr id="10" name="Rechteck 9"/>
+          <p:cNvSpPr/>
+          <p:nvPr/>
+        </p:nvSpPr>
+        <p:spPr>
+          <a:xfrm>
+            <a:off x="3704437" y="5475915"/>
+            <a:ext cx="4578991" cy="613096"/>
+          </a:xfrm>
+          <a:prstGeom prst="rect">
+            <a:avLst/>
+          </a:prstGeom>
+          <a:solidFill>
+            <a:schemeClr val="accent1"/>
+          </a:solidFill>
+          <a:ln>
+            <a:solidFill>
+              <a:schemeClr val="accent1"/>
+            </a:solidFill>
+          </a:ln>
+        </p:spPr>
+        <p:style>
+          <a:lnRef idx="2">
+            <a:schemeClr val="accent1">
+              <a:shade val="50000"/>
+            </a:schemeClr>
+          </a:lnRef>
+          <a:fillRef idx="1">
+            <a:schemeClr val="accent1"/>
+          </a:fillRef>
+          <a:effectRef idx="0">
+            <a:schemeClr val="accent1"/>
+          </a:effectRef>
+          <a:fontRef idx="minor">
+            <a:schemeClr val="lt1"/>
+          </a:fontRef>
+        </p:style>
+        <p:txBody>
+          <a:bodyPr rtlCol="0" anchor="ctr"/>
+          <a:lstStyle/>
+          <a:p>
+            <a:pPr algn="ctr"/>
+            <a:r>
+              <a:rPr lang="de-CH" dirty="0" err="1"/>
+              <a:t>Resource</a:t>
+            </a:r>
+            <a:r>
+              <a:rPr lang="de-CH" dirty="0"/>
+              <a:t> </a:t>
+            </a:r>
+            <a:r>
+              <a:rPr lang="de-CH" dirty="0" err="1"/>
+              <a:t>Logic</a:t>
+            </a:r>
+            <a:endParaRPr lang="de-CH" dirty="0"/>
+          </a:p>
+        </p:txBody>
+      </p:sp>
+      <p:cxnSp>
+        <p:nvCxnSpPr>
+          <p:cNvPr id="12" name="Gerader Verbinder 11"/>
+          <p:cNvCxnSpPr>
+            <a:stCxn id="2" idx="2"/>
+            <a:endCxn id="4" idx="0"/>
+          </p:cNvCxnSpPr>
+          <p:nvPr/>
+        </p:nvCxnSpPr>
+        <p:spPr>
+          <a:xfrm flipH="1">
+            <a:off x="5993933" y="1468073"/>
+            <a:ext cx="1" cy="446014"/>
+          </a:xfrm>
+          <a:prstGeom prst="line">
+            <a:avLst/>
+          </a:prstGeom>
+          <a:ln w="19050">
+            <a:solidFill>
+              <a:schemeClr val="tx1">
+                <a:lumMod val="65000"/>
+                <a:lumOff val="35000"/>
+              </a:schemeClr>
+            </a:solidFill>
+          </a:ln>
+        </p:spPr>
+        <p:style>
+          <a:lnRef idx="1">
+            <a:schemeClr val="accent1"/>
+          </a:lnRef>
+          <a:fillRef idx="0">
+            <a:schemeClr val="accent1"/>
+          </a:fillRef>
+          <a:effectRef idx="0">
+            <a:schemeClr val="accent1"/>
+          </a:effectRef>
+          <a:fontRef idx="minor">
+            <a:schemeClr val="tx1"/>
+          </a:fontRef>
+        </p:style>
+      </p:cxnSp>
+      <p:cxnSp>
+        <p:nvCxnSpPr>
+          <p:cNvPr id="13" name="Gerader Verbinder 12"/>
+          <p:cNvCxnSpPr>
+            <a:stCxn id="4" idx="2"/>
+            <a:endCxn id="9" idx="0"/>
+          </p:cNvCxnSpPr>
+          <p:nvPr/>
+        </p:nvCxnSpPr>
+        <p:spPr>
+          <a:xfrm>
+            <a:off x="5993933" y="4966283"/>
+            <a:ext cx="0" cy="446014"/>
+          </a:xfrm>
+          <a:prstGeom prst="line">
+            <a:avLst/>
+          </a:prstGeom>
+          <a:ln w="19050">
+            <a:solidFill>
+              <a:schemeClr val="tx1">
+                <a:lumMod val="65000"/>
+                <a:lumOff val="35000"/>
+              </a:schemeClr>
+            </a:solidFill>
+          </a:ln>
+        </p:spPr>
+        <p:style>
+          <a:lnRef idx="1">
+            <a:schemeClr val="accent1"/>
+          </a:lnRef>
+          <a:fillRef idx="0">
+            <a:schemeClr val="accent1"/>
+          </a:fillRef>
+          <a:effectRef idx="0">
+            <a:schemeClr val="accent1"/>
+          </a:effectRef>
+          <a:fontRef idx="minor">
+            <a:schemeClr val="tx1"/>
+          </a:fontRef>
+        </p:style>
+      </p:cxnSp>
+    </p:spTree>
+    <p:extLst>
+      <p:ext uri="{BB962C8B-B14F-4D97-AF65-F5344CB8AC3E}">
+        <p14:creationId xmlns:p14="http://schemas.microsoft.com/office/powerpoint/2010/main" val="1426114231"/>
+      </p:ext>
+    </p:extLst>
+  </p:cSld>
+  <p:clrMapOvr>
+    <a:masterClrMapping/>
+  </p:clrMapOvr>
+</p:sld>
+</file>
+
 <file path=ppt/theme/theme1.xml><?xml version="1.0" encoding="utf-8"?>
 <a:theme xmlns:a="http://schemas.openxmlformats.org/drawingml/2006/main" name="Office">
   <a:themeElements>

</xml_diff>